<commit_message>
figures changes, mostly useless
</commit_message>
<xml_diff>
--- a/figures/results-summary.pptx
+++ b/figures/results-summary.pptx
@@ -270,7 +270,7 @@
           <a:p>
             <a:fld id="{49F74621-41EF-184D-9E54-7BF35210D3D1}" type="datetimeFigureOut">
               <a:rPr lang="en-US" smtClean="0"/>
-              <a:t>1/20/22</a:t>
+              <a:t>1/24/22</a:t>
             </a:fld>
             <a:endParaRPr lang="en-US"/>
           </a:p>
@@ -468,7 +468,7 @@
           <a:p>
             <a:fld id="{49F74621-41EF-184D-9E54-7BF35210D3D1}" type="datetimeFigureOut">
               <a:rPr lang="en-US" smtClean="0"/>
-              <a:t>1/20/22</a:t>
+              <a:t>1/24/22</a:t>
             </a:fld>
             <a:endParaRPr lang="en-US"/>
           </a:p>
@@ -676,7 +676,7 @@
           <a:p>
             <a:fld id="{49F74621-41EF-184D-9E54-7BF35210D3D1}" type="datetimeFigureOut">
               <a:rPr lang="en-US" smtClean="0"/>
-              <a:t>1/20/22</a:t>
+              <a:t>1/24/22</a:t>
             </a:fld>
             <a:endParaRPr lang="en-US"/>
           </a:p>
@@ -874,7 +874,7 @@
           <a:p>
             <a:fld id="{49F74621-41EF-184D-9E54-7BF35210D3D1}" type="datetimeFigureOut">
               <a:rPr lang="en-US" smtClean="0"/>
-              <a:t>1/20/22</a:t>
+              <a:t>1/24/22</a:t>
             </a:fld>
             <a:endParaRPr lang="en-US"/>
           </a:p>
@@ -1149,7 +1149,7 @@
           <a:p>
             <a:fld id="{49F74621-41EF-184D-9E54-7BF35210D3D1}" type="datetimeFigureOut">
               <a:rPr lang="en-US" smtClean="0"/>
-              <a:t>1/20/22</a:t>
+              <a:t>1/24/22</a:t>
             </a:fld>
             <a:endParaRPr lang="en-US"/>
           </a:p>
@@ -1414,7 +1414,7 @@
           <a:p>
             <a:fld id="{49F74621-41EF-184D-9E54-7BF35210D3D1}" type="datetimeFigureOut">
               <a:rPr lang="en-US" smtClean="0"/>
-              <a:t>1/20/22</a:t>
+              <a:t>1/24/22</a:t>
             </a:fld>
             <a:endParaRPr lang="en-US"/>
           </a:p>
@@ -1826,7 +1826,7 @@
           <a:p>
             <a:fld id="{49F74621-41EF-184D-9E54-7BF35210D3D1}" type="datetimeFigureOut">
               <a:rPr lang="en-US" smtClean="0"/>
-              <a:t>1/20/22</a:t>
+              <a:t>1/24/22</a:t>
             </a:fld>
             <a:endParaRPr lang="en-US"/>
           </a:p>
@@ -1967,7 +1967,7 @@
           <a:p>
             <a:fld id="{49F74621-41EF-184D-9E54-7BF35210D3D1}" type="datetimeFigureOut">
               <a:rPr lang="en-US" smtClean="0"/>
-              <a:t>1/20/22</a:t>
+              <a:t>1/24/22</a:t>
             </a:fld>
             <a:endParaRPr lang="en-US"/>
           </a:p>
@@ -2080,7 +2080,7 @@
           <a:p>
             <a:fld id="{49F74621-41EF-184D-9E54-7BF35210D3D1}" type="datetimeFigureOut">
               <a:rPr lang="en-US" smtClean="0"/>
-              <a:t>1/20/22</a:t>
+              <a:t>1/24/22</a:t>
             </a:fld>
             <a:endParaRPr lang="en-US"/>
           </a:p>
@@ -2391,7 +2391,7 @@
           <a:p>
             <a:fld id="{49F74621-41EF-184D-9E54-7BF35210D3D1}" type="datetimeFigureOut">
               <a:rPr lang="en-US" smtClean="0"/>
-              <a:t>1/20/22</a:t>
+              <a:t>1/24/22</a:t>
             </a:fld>
             <a:endParaRPr lang="en-US"/>
           </a:p>
@@ -2679,7 +2679,7 @@
           <a:p>
             <a:fld id="{49F74621-41EF-184D-9E54-7BF35210D3D1}" type="datetimeFigureOut">
               <a:rPr lang="en-US" smtClean="0"/>
-              <a:t>1/20/22</a:t>
+              <a:t>1/24/22</a:t>
             </a:fld>
             <a:endParaRPr lang="en-US"/>
           </a:p>
@@ -2920,7 +2920,7 @@
           <a:p>
             <a:fld id="{49F74621-41EF-184D-9E54-7BF35210D3D1}" type="datetimeFigureOut">
               <a:rPr lang="en-US" smtClean="0"/>
-              <a:t>1/20/22</a:t>
+              <a:t>1/24/22</a:t>
             </a:fld>
             <a:endParaRPr lang="en-US"/>
           </a:p>
@@ -3359,8 +3359,8 @@
         </p:blipFill>
         <p:spPr>
           <a:xfrm>
-            <a:off x="6108356" y="578540"/>
-            <a:ext cx="6062279" cy="2943139"/>
+            <a:off x="139529" y="3518842"/>
+            <a:ext cx="6592185" cy="3200400"/>
           </a:xfrm>
           <a:prstGeom prst="rect">
             <a:avLst/>
@@ -3369,10 +3369,10 @@
       </p:pic>
       <p:pic>
         <p:nvPicPr>
-          <p:cNvPr id="6" name="Picture 5">
-            <a:extLst>
-              <a:ext uri="{FF2B5EF4-FFF2-40B4-BE49-F238E27FC236}">
-                <a16:creationId xmlns:a16="http://schemas.microsoft.com/office/drawing/2014/main" id="{ACC71B6A-29C7-C94E-ADBD-7342C74025E3}"/>
+          <p:cNvPr id="4" name="Picture 3">
+            <a:extLst>
+              <a:ext uri="{FF2B5EF4-FFF2-40B4-BE49-F238E27FC236}">
+                <a16:creationId xmlns:a16="http://schemas.microsoft.com/office/drawing/2014/main" id="{99BB6C59-F315-A94B-BBB8-32B23EF9385A}"/>
               </a:ext>
             </a:extLst>
           </p:cNvPr>
@@ -3389,150 +3389,8 @@
         </p:blipFill>
         <p:spPr>
           <a:xfrm>
-            <a:off x="6108357" y="3741870"/>
-            <a:ext cx="6062472" cy="2943232"/>
-          </a:xfrm>
-          <a:prstGeom prst="rect">
-            <a:avLst/>
-          </a:prstGeom>
-        </p:spPr>
-      </p:pic>
-      <p:sp>
-        <p:nvSpPr>
-          <p:cNvPr id="8" name="TextBox 7">
-            <a:extLst>
-              <a:ext uri="{FF2B5EF4-FFF2-40B4-BE49-F238E27FC236}">
-                <a16:creationId xmlns:a16="http://schemas.microsoft.com/office/drawing/2014/main" id="{B20B3F62-8D4A-2F4D-A14D-85C1D9AC186E}"/>
-              </a:ext>
-            </a:extLst>
-          </p:cNvPr>
-          <p:cNvSpPr txBox="1"/>
-          <p:nvPr/>
-        </p:nvSpPr>
-        <p:spPr>
-          <a:xfrm>
-            <a:off x="6205238" y="37328"/>
-            <a:ext cx="5638980" cy="430887"/>
-          </a:xfrm>
-          <a:prstGeom prst="rect">
-            <a:avLst/>
-          </a:prstGeom>
-          <a:noFill/>
-        </p:spPr>
-        <p:txBody>
-          <a:bodyPr wrap="none" rtlCol="0">
-            <a:spAutoFit/>
-          </a:bodyPr>
-          <a:lstStyle/>
-          <a:p>
-            <a:r>
-              <a:rPr lang="en-US" sz="2200" b="1" dirty="0">
-                <a:solidFill>
-                  <a:schemeClr val="accent3">
-                    <a:lumMod val="50000"/>
-                  </a:schemeClr>
-                </a:solidFill>
-              </a:rPr>
-              <a:t>Intervention behavior reflects bot competence</a:t>
-            </a:r>
-          </a:p>
-        </p:txBody>
-      </p:sp>
-      <p:pic>
-        <p:nvPicPr>
-          <p:cNvPr id="11" name="Picture 10">
-            <a:extLst>
-              <a:ext uri="{FF2B5EF4-FFF2-40B4-BE49-F238E27FC236}">
-                <a16:creationId xmlns:a16="http://schemas.microsoft.com/office/drawing/2014/main" id="{93709250-99E1-2A4C-AFE4-D77C37EAF695}"/>
-              </a:ext>
-            </a:extLst>
-          </p:cNvPr>
-          <p:cNvPicPr>
-            <a:picLocks noChangeAspect="1"/>
-          </p:cNvPicPr>
-          <p:nvPr/>
-        </p:nvPicPr>
-        <p:blipFill>
-          <a:blip r:embed="rId4"/>
-          <a:stretch>
-            <a:fillRect/>
-          </a:stretch>
-        </p:blipFill>
-        <p:spPr>
-          <a:xfrm>
-            <a:off x="699188" y="578540"/>
-            <a:ext cx="4754029" cy="2944368"/>
-          </a:xfrm>
-          <a:prstGeom prst="rect">
-            <a:avLst/>
-          </a:prstGeom>
-        </p:spPr>
-      </p:pic>
-      <p:sp>
-        <p:nvSpPr>
-          <p:cNvPr id="12" name="TextBox 11">
-            <a:extLst>
-              <a:ext uri="{FF2B5EF4-FFF2-40B4-BE49-F238E27FC236}">
-                <a16:creationId xmlns:a16="http://schemas.microsoft.com/office/drawing/2014/main" id="{553B52A1-4940-F54A-89A3-32E138D1746C}"/>
-              </a:ext>
-            </a:extLst>
-          </p:cNvPr>
-          <p:cNvSpPr txBox="1"/>
-          <p:nvPr/>
-        </p:nvSpPr>
-        <p:spPr>
-          <a:xfrm>
-            <a:off x="1025800" y="37328"/>
-            <a:ext cx="4100803" cy="430887"/>
-          </a:xfrm>
-          <a:prstGeom prst="rect">
-            <a:avLst/>
-          </a:prstGeom>
-          <a:noFill/>
-        </p:spPr>
-        <p:txBody>
-          <a:bodyPr wrap="none" rtlCol="0">
-            <a:spAutoFit/>
-          </a:bodyPr>
-          <a:lstStyle/>
-          <a:p>
-            <a:r>
-              <a:rPr lang="en-US" sz="2200" b="1" dirty="0">
-                <a:solidFill>
-                  <a:schemeClr val="accent3">
-                    <a:lumMod val="50000"/>
-                  </a:schemeClr>
-                </a:solidFill>
-              </a:rPr>
-              <a:t>People succeed with bot partners</a:t>
-            </a:r>
-          </a:p>
-        </p:txBody>
-      </p:sp>
-      <p:pic>
-        <p:nvPicPr>
-          <p:cNvPr id="16" name="Picture 15">
-            <a:extLst>
-              <a:ext uri="{FF2B5EF4-FFF2-40B4-BE49-F238E27FC236}">
-                <a16:creationId xmlns:a16="http://schemas.microsoft.com/office/drawing/2014/main" id="{83D97E84-3833-F54D-9D7B-F14B31620F19}"/>
-              </a:ext>
-            </a:extLst>
-          </p:cNvPr>
-          <p:cNvPicPr>
-            <a:picLocks noChangeAspect="1"/>
-          </p:cNvPicPr>
-          <p:nvPr/>
-        </p:nvPicPr>
-        <p:blipFill>
-          <a:blip r:embed="rId5"/>
-          <a:stretch>
-            <a:fillRect/>
-          </a:stretch>
-        </p:blipFill>
-        <p:spPr>
-          <a:xfrm>
-            <a:off x="699188" y="3741870"/>
-            <a:ext cx="4000819" cy="2944368"/>
+            <a:off x="139529" y="138759"/>
+            <a:ext cx="6539023" cy="3200400"/>
           </a:xfrm>
           <a:prstGeom prst="rect">
             <a:avLst/>

</xml_diff>